<commit_message>
slides: minor slide revisions ; survey results now reflect 2021 questionnaire
</commit_message>
<xml_diff>
--- a/slides/classes.pptx
+++ b/slides/classes.pptx
@@ -226,7 +226,7 @@
           <a:p>
             <a:fld id="{B7A48688-84F4-1E49-8ACA-B3D0469C8F43}" type="datetimeFigureOut">
               <a:rPr lang="en-US" smtClean="0"/>
-              <a:t>4/30/21</a:t>
+              <a:t>5/7/21</a:t>
             </a:fld>
             <a:endParaRPr lang="en-US"/>
           </a:p>
@@ -1481,7 +1481,7 @@
           <a:p>
             <a:fld id="{51673806-0BCD-1F42-BAA8-2011034B3C6A}" type="datetimeFigureOut">
               <a:rPr lang="en-US" smtClean="0"/>
-              <a:t>4/30/21</a:t>
+              <a:t>5/7/21</a:t>
             </a:fld>
             <a:endParaRPr lang="en-US"/>
           </a:p>
@@ -1895,7 +1895,7 @@
           <a:p>
             <a:fld id="{51673806-0BCD-1F42-BAA8-2011034B3C6A}" type="datetimeFigureOut">
               <a:rPr lang="en-US" smtClean="0"/>
-              <a:t>4/30/21</a:t>
+              <a:t>5/7/21</a:t>
             </a:fld>
             <a:endParaRPr lang="en-US"/>
           </a:p>
@@ -2226,7 +2226,7 @@
           <a:p>
             <a:fld id="{51673806-0BCD-1F42-BAA8-2011034B3C6A}" type="datetimeFigureOut">
               <a:rPr lang="en-US" smtClean="0"/>
-              <a:t>4/30/21</a:t>
+              <a:t>5/7/21</a:t>
             </a:fld>
             <a:endParaRPr lang="en-US"/>
           </a:p>
@@ -2626,7 +2626,7 @@
           <a:p>
             <a:fld id="{51673806-0BCD-1F42-BAA8-2011034B3C6A}" type="datetimeFigureOut">
               <a:rPr lang="en-US" smtClean="0"/>
-              <a:t>4/30/21</a:t>
+              <a:t>5/7/21</a:t>
             </a:fld>
             <a:endParaRPr lang="en-US"/>
           </a:p>
@@ -3189,7 +3189,7 @@
           <a:p>
             <a:fld id="{51673806-0BCD-1F42-BAA8-2011034B3C6A}" type="datetimeFigureOut">
               <a:rPr lang="en-US" smtClean="0"/>
-              <a:t>4/30/21</a:t>
+              <a:t>5/7/21</a:t>
             </a:fld>
             <a:endParaRPr lang="en-US"/>
           </a:p>
@@ -3865,7 +3865,7 @@
           <a:p>
             <a:fld id="{51673806-0BCD-1F42-BAA8-2011034B3C6A}" type="datetimeFigureOut">
               <a:rPr lang="en-US" smtClean="0"/>
-              <a:t>4/30/21</a:t>
+              <a:t>5/7/21</a:t>
             </a:fld>
             <a:endParaRPr lang="en-US"/>
           </a:p>
@@ -4773,7 +4773,7 @@
           <a:p>
             <a:fld id="{51673806-0BCD-1F42-BAA8-2011034B3C6A}" type="datetimeFigureOut">
               <a:rPr lang="en-US" smtClean="0"/>
-              <a:t>4/30/21</a:t>
+              <a:t>5/7/21</a:t>
             </a:fld>
             <a:endParaRPr lang="en-US"/>
           </a:p>
@@ -5081,7 +5081,7 @@
           <a:p>
             <a:fld id="{51673806-0BCD-1F42-BAA8-2011034B3C6A}" type="datetimeFigureOut">
               <a:rPr lang="en-US" smtClean="0"/>
-              <a:t>4/30/21</a:t>
+              <a:t>5/7/21</a:t>
             </a:fld>
             <a:endParaRPr lang="en-US"/>
           </a:p>
@@ -5340,7 +5340,7 @@
           <a:p>
             <a:fld id="{51673806-0BCD-1F42-BAA8-2011034B3C6A}" type="datetimeFigureOut">
               <a:rPr lang="en-US" smtClean="0"/>
-              <a:t>4/30/21</a:t>
+              <a:t>5/7/21</a:t>
             </a:fld>
             <a:endParaRPr lang="en-US"/>
           </a:p>
@@ -5663,7 +5663,7 @@
           <a:p>
             <a:fld id="{51673806-0BCD-1F42-BAA8-2011034B3C6A}" type="datetimeFigureOut">
               <a:rPr lang="en-US" smtClean="0"/>
-              <a:t>4/30/21</a:t>
+              <a:t>5/7/21</a:t>
             </a:fld>
             <a:endParaRPr lang="en-US"/>
           </a:p>
@@ -6047,7 +6047,7 @@
           <a:p>
             <a:fld id="{51673806-0BCD-1F42-BAA8-2011034B3C6A}" type="datetimeFigureOut">
               <a:rPr lang="en-US" smtClean="0"/>
-              <a:t>4/30/21</a:t>
+              <a:t>5/7/21</a:t>
             </a:fld>
             <a:endParaRPr lang="en-US"/>
           </a:p>
@@ -6423,7 +6423,7 @@
           <a:p>
             <a:fld id="{51673806-0BCD-1F42-BAA8-2011034B3C6A}" type="datetimeFigureOut">
               <a:rPr lang="en-US" smtClean="0"/>
-              <a:t>4/30/21</a:t>
+              <a:t>5/7/21</a:t>
             </a:fld>
             <a:endParaRPr lang="en-US"/>
           </a:p>
@@ -6929,7 +6929,7 @@
           <a:p>
             <a:fld id="{51673806-0BCD-1F42-BAA8-2011034B3C6A}" type="datetimeFigureOut">
               <a:rPr lang="en-US" smtClean="0"/>
-              <a:t>4/30/21</a:t>
+              <a:t>5/7/21</a:t>
             </a:fld>
             <a:endParaRPr lang="en-US"/>
           </a:p>
@@ -7186,7 +7186,7 @@
           <a:p>
             <a:fld id="{51673806-0BCD-1F42-BAA8-2011034B3C6A}" type="datetimeFigureOut">
               <a:rPr lang="en-US" smtClean="0"/>
-              <a:t>4/30/21</a:t>
+              <a:t>5/7/21</a:t>
             </a:fld>
             <a:endParaRPr lang="en-US"/>
           </a:p>
@@ -7344,7 +7344,7 @@
           <a:p>
             <a:fld id="{51673806-0BCD-1F42-BAA8-2011034B3C6A}" type="datetimeFigureOut">
               <a:rPr lang="en-US" smtClean="0"/>
-              <a:t>4/30/21</a:t>
+              <a:t>5/7/21</a:t>
             </a:fld>
             <a:endParaRPr lang="en-US"/>
           </a:p>
@@ -7734,7 +7734,7 @@
           <a:p>
             <a:fld id="{51673806-0BCD-1F42-BAA8-2011034B3C6A}" type="datetimeFigureOut">
               <a:rPr lang="en-US" smtClean="0"/>
-              <a:t>4/30/21</a:t>
+              <a:t>5/7/21</a:t>
             </a:fld>
             <a:endParaRPr lang="en-US"/>
           </a:p>
@@ -8143,7 +8143,7 @@
           <a:p>
             <a:fld id="{51673806-0BCD-1F42-BAA8-2011034B3C6A}" type="datetimeFigureOut">
               <a:rPr lang="en-US" smtClean="0"/>
-              <a:t>4/30/21</a:t>
+              <a:t>5/7/21</a:t>
             </a:fld>
             <a:endParaRPr lang="en-US"/>
           </a:p>
@@ -8391,7 +8391,7 @@
             <a:fld id="{51673806-0BCD-1F42-BAA8-2011034B3C6A}" type="datetimeFigureOut">
               <a:rPr lang="en-US" smtClean="0"/>
               <a:pPr/>
-              <a:t>4/30/21</a:t>
+              <a:t>5/7/21</a:t>
             </a:fld>
             <a:endParaRPr lang="en-US" dirty="0"/>
           </a:p>

</xml_diff>

<commit_message>
slides: minor updates to sessions 4 and 5
</commit_message>
<xml_diff>
--- a/slides/classes.pptx
+++ b/slides/classes.pptx
@@ -228,7 +228,7 @@
           <a:p>
             <a:fld id="{B7A48688-84F4-1E49-8ACA-B3D0469C8F43}" type="datetimeFigureOut">
               <a:rPr lang="en-US" smtClean="0"/>
-              <a:t>5/15/22</a:t>
+              <a:t>5/16/22</a:t>
             </a:fld>
             <a:endParaRPr lang="en-US"/>
           </a:p>
@@ -628,11 +628,19 @@
           <a:p>
             <a:r>
               <a:rPr lang="en-US" dirty="0"/>
-              <a:t>Note verbally here that when developers speak</a:t>
+              <a:t>Note</a:t>
             </a:r>
             <a:r>
               <a:rPr lang="en-US" baseline="0" dirty="0"/>
-              <a:t> of ”callable objects” they’re not just referring to functions. This also includes classes with a __call__ function. </a:t>
+              <a:t> verbally that the </a:t>
+            </a:r>
+            <a:r>
+              <a:rPr lang="en-US" baseline="0" dirty="0" err="1"/>
+              <a:t>coeffs.setter</a:t>
+            </a:r>
+            <a:r>
+              <a:rPr lang="en-US" baseline="0" dirty="0"/>
+              <a:t> function is a good example of production-level code </a:t>
             </a:r>
             <a:endParaRPr lang="en-US" dirty="0"/>
           </a:p>
@@ -655,7 +663,7 @@
           <a:p>
             <a:fld id="{FB38BE01-6562-DE45-9404-D6DD8A86E18A}" type="slidenum">
               <a:rPr lang="en-US" smtClean="0"/>
-              <a:t>21</a:t>
+              <a:t>20</a:t>
             </a:fld>
             <a:endParaRPr lang="en-US"/>
           </a:p>
@@ -664,7 +672,7 @@
     </p:spTree>
     <p:extLst>
       <p:ext uri="{BB962C8B-B14F-4D97-AF65-F5344CB8AC3E}">
-        <p14:creationId xmlns:p14="http://schemas.microsoft.com/office/powerpoint/2010/main" val="810331557"/>
+        <p14:creationId xmlns:p14="http://schemas.microsoft.com/office/powerpoint/2010/main" val="505673754"/>
       </p:ext>
     </p:extLst>
   </p:cSld>
@@ -720,15 +728,99 @@
           <a:p>
             <a:r>
               <a:rPr lang="en-US" dirty="0"/>
-              <a:t>Note verbally that this definition of __</a:t>
-            </a:r>
-            <a:r>
-              <a:rPr lang="en-US" dirty="0" err="1"/>
-              <a:t>str</a:t>
-            </a:r>
-            <a:r>
-              <a:rPr lang="en-US" dirty="0"/>
-              <a:t>__ is</a:t>
+              <a:t>Note verbally here that when developers speak</a:t>
+            </a:r>
+            <a:r>
+              <a:rPr lang="en-US" baseline="0" dirty="0"/>
+              <a:t> of ”callable objects” they’re not just referring to functions. This also includes classes with a __call__ function. </a:t>
+            </a:r>
+            <a:endParaRPr lang="en-US" dirty="0"/>
+          </a:p>
+        </p:txBody>
+      </p:sp>
+      <p:sp>
+        <p:nvSpPr>
+          <p:cNvPr id="4" name="Slide Number Placeholder 3"/>
+          <p:cNvSpPr>
+            <a:spLocks noGrp="1"/>
+          </p:cNvSpPr>
+          <p:nvPr>
+            <p:ph type="sldNum" sz="quarter" idx="10"/>
+          </p:nvPr>
+        </p:nvSpPr>
+        <p:spPr/>
+        <p:txBody>
+          <a:bodyPr/>
+          <a:lstStyle/>
+          <a:p>
+            <a:fld id="{FB38BE01-6562-DE45-9404-D6DD8A86E18A}" type="slidenum">
+              <a:rPr lang="en-US" smtClean="0"/>
+              <a:t>21</a:t>
+            </a:fld>
+            <a:endParaRPr lang="en-US"/>
+          </a:p>
+        </p:txBody>
+      </p:sp>
+    </p:spTree>
+    <p:extLst>
+      <p:ext uri="{BB962C8B-B14F-4D97-AF65-F5344CB8AC3E}">
+        <p14:creationId xmlns:p14="http://schemas.microsoft.com/office/powerpoint/2010/main" val="810331557"/>
+      </p:ext>
+    </p:extLst>
+  </p:cSld>
+  <p:clrMapOvr>
+    <a:masterClrMapping/>
+  </p:clrMapOvr>
+</p:notes>
+</file>
+
+<file path=ppt/notesSlides/notesSlide12.xml><?xml version="1.0" encoding="utf-8"?>
+<p:notes xmlns:a="http://schemas.openxmlformats.org/drawingml/2006/main" xmlns:r="http://schemas.openxmlformats.org/officeDocument/2006/relationships" xmlns:p="http://schemas.openxmlformats.org/presentationml/2006/main">
+  <p:cSld>
+    <p:spTree>
+      <p:nvGrpSpPr>
+        <p:cNvPr id="1" name=""/>
+        <p:cNvGrpSpPr/>
+        <p:nvPr/>
+      </p:nvGrpSpPr>
+      <p:grpSpPr>
+        <a:xfrm>
+          <a:off x="0" y="0"/>
+          <a:ext cx="0" cy="0"/>
+          <a:chOff x="0" y="0"/>
+          <a:chExt cx="0" cy="0"/>
+        </a:xfrm>
+      </p:grpSpPr>
+      <p:sp>
+        <p:nvSpPr>
+          <p:cNvPr id="2" name="Slide Image Placeholder 1"/>
+          <p:cNvSpPr>
+            <a:spLocks noGrp="1" noRot="1" noChangeAspect="1"/>
+          </p:cNvSpPr>
+          <p:nvPr>
+            <p:ph type="sldImg"/>
+          </p:nvPr>
+        </p:nvSpPr>
+        <p:spPr/>
+      </p:sp>
+      <p:sp>
+        <p:nvSpPr>
+          <p:cNvPr id="3" name="Notes Placeholder 2"/>
+          <p:cNvSpPr>
+            <a:spLocks noGrp="1"/>
+          </p:cNvSpPr>
+          <p:nvPr>
+            <p:ph type="body" idx="1"/>
+          </p:nvPr>
+        </p:nvSpPr>
+        <p:spPr/>
+        <p:txBody>
+          <a:bodyPr/>
+          <a:lstStyle/>
+          <a:p>
+            <a:r>
+              <a:rPr lang="en-US" dirty="0"/>
+              <a:t>Note verbally that this definition of __str__ is</a:t>
             </a:r>
             <a:r>
               <a:rPr lang="en-US" baseline="0" dirty="0"/>
@@ -782,7 +874,7 @@
 </p:notes>
 </file>
 
-<file path=ppt/notesSlides/notesSlide12.xml><?xml version="1.0" encoding="utf-8"?>
+<file path=ppt/notesSlides/notesSlide13.xml><?xml version="1.0" encoding="utf-8"?>
 <p:notes xmlns:a="http://schemas.openxmlformats.org/drawingml/2006/main" xmlns:r="http://schemas.openxmlformats.org/officeDocument/2006/relationships" xmlns:p="http://schemas.openxmlformats.org/presentationml/2006/main">
   <p:cSld>
     <p:spTree>
@@ -910,6 +1002,23 @@
           <a:bodyPr/>
           <a:lstStyle/>
           <a:p>
+            <a:pPr marL="0" marR="0" lvl="0" indent="0" algn="l" defTabSz="914400" rtl="0" eaLnBrk="1" fontAlgn="auto" latinLnBrk="0" hangingPunct="1">
+              <a:lnSpc>
+                <a:spcPct val="100000"/>
+              </a:lnSpc>
+              <a:spcBef>
+                <a:spcPts val="0"/>
+              </a:spcBef>
+              <a:spcAft>
+                <a:spcPts val="0"/>
+              </a:spcAft>
+              <a:buClrTx/>
+              <a:buSzTx/>
+              <a:buFontTx/>
+              <a:buNone/>
+              <a:tabLst/>
+              <a:defRPr/>
+            </a:pPr>
             <a:r>
               <a:rPr lang="en-US" dirty="0"/>
               <a:t>We’ll see another example focusing on the meaning of </a:t>
@@ -943,7 +1052,7 @@
           <a:p>
             <a:fld id="{FB38BE01-6562-DE45-9404-D6DD8A86E18A}" type="slidenum">
               <a:rPr lang="en-US" smtClean="0"/>
-              <a:t>7</a:t>
+              <a:t>6</a:t>
             </a:fld>
             <a:endParaRPr lang="en-US"/>
           </a:p>
@@ -952,7 +1061,7 @@
     </p:spTree>
     <p:extLst>
       <p:ext uri="{BB962C8B-B14F-4D97-AF65-F5344CB8AC3E}">
-        <p14:creationId xmlns:p14="http://schemas.microsoft.com/office/powerpoint/2010/main" val="2669075619"/>
+        <p14:creationId xmlns:p14="http://schemas.microsoft.com/office/powerpoint/2010/main" val="2404131526"/>
       </p:ext>
     </p:extLst>
   </p:cSld>
@@ -1008,35 +1117,15 @@
           <a:p>
             <a:r>
               <a:rPr lang="en-US" dirty="0"/>
-              <a:t>Note verbally</a:t>
-            </a:r>
-            <a:r>
-              <a:rPr lang="en-US" baseline="0" dirty="0"/>
-              <a:t> here that @property, @</a:t>
-            </a:r>
-            <a:r>
-              <a:rPr lang="en-US" baseline="0" dirty="0" err="1"/>
-              <a:t>name.setter</a:t>
-            </a:r>
-            <a:r>
-              <a:rPr lang="en-US" baseline="0" dirty="0"/>
-              <a:t>, and @</a:t>
-            </a:r>
-            <a:r>
-              <a:rPr lang="en-US" baseline="0" dirty="0" err="1"/>
-              <a:t>breed.setter</a:t>
-            </a:r>
-            <a:r>
-              <a:rPr lang="en-US" baseline="0" dirty="0"/>
-              <a:t> are called decorators, and that we’ll see some more of them in a second. You can make your own decorators but that’s a bit outside the scope of the </a:t>
-            </a:r>
-            <a:r>
-              <a:rPr lang="en-US" baseline="0" dirty="0" err="1"/>
-              <a:t>bootcamp</a:t>
-            </a:r>
-            <a:r>
-              <a:rPr lang="en-US" baseline="0" dirty="0"/>
-              <a:t>. </a:t>
+              <a:t>We’ll see another example focusing on the meaning of </a:t>
+            </a:r>
+            <a:r>
+              <a:rPr lang="en-US" i="1" dirty="0"/>
+              <a:t>self</a:t>
+            </a:r>
+            <a:r>
+              <a:rPr lang="en-US" i="0" dirty="0"/>
+              <a:t> in a few slides.</a:t>
             </a:r>
             <a:endParaRPr lang="en-US" dirty="0"/>
           </a:p>
@@ -1049,7 +1138,7 @@
             <a:spLocks noGrp="1"/>
           </p:cNvSpPr>
           <p:nvPr>
-            <p:ph type="sldNum" sz="quarter" idx="10"/>
+            <p:ph type="sldNum" sz="quarter" idx="5"/>
           </p:nvPr>
         </p:nvSpPr>
         <p:spPr/>
@@ -1059,7 +1148,7 @@
           <a:p>
             <a:fld id="{FB38BE01-6562-DE45-9404-D6DD8A86E18A}" type="slidenum">
               <a:rPr lang="en-US" smtClean="0"/>
-              <a:t>9</a:t>
+              <a:t>7</a:t>
             </a:fld>
             <a:endParaRPr lang="en-US"/>
           </a:p>
@@ -1068,7 +1157,7 @@
     </p:spTree>
     <p:extLst>
       <p:ext uri="{BB962C8B-B14F-4D97-AF65-F5344CB8AC3E}">
-        <p14:creationId xmlns:p14="http://schemas.microsoft.com/office/powerpoint/2010/main" val="192457221"/>
+        <p14:creationId xmlns:p14="http://schemas.microsoft.com/office/powerpoint/2010/main" val="2669075619"/>
       </p:ext>
     </p:extLst>
   </p:cSld>
@@ -1124,16 +1213,37 @@
           <a:p>
             <a:r>
               <a:rPr lang="en-US" dirty="0"/>
-              <a:t>We’ll get back to </a:t>
-            </a:r>
-            <a:r>
-              <a:rPr lang="en-US" dirty="0" err="1"/>
-              <a:t>doggos</a:t>
-            </a:r>
-            <a:r>
-              <a:rPr lang="en-US" dirty="0"/>
-              <a:t> in just a second.</a:t>
-            </a:r>
+              <a:t>Note verbally</a:t>
+            </a:r>
+            <a:r>
+              <a:rPr lang="en-US" baseline="0" dirty="0"/>
+              <a:t> here that @property, @</a:t>
+            </a:r>
+            <a:r>
+              <a:rPr lang="en-US" baseline="0" dirty="0" err="1"/>
+              <a:t>name.setter</a:t>
+            </a:r>
+            <a:r>
+              <a:rPr lang="en-US" baseline="0" dirty="0"/>
+              <a:t>, and @</a:t>
+            </a:r>
+            <a:r>
+              <a:rPr lang="en-US" baseline="0" dirty="0" err="1"/>
+              <a:t>breed.setter</a:t>
+            </a:r>
+            <a:r>
+              <a:rPr lang="en-US" baseline="0" dirty="0"/>
+              <a:t> are called decorators, and that we’ll see some more of them in a second. You can make your own decorators but that’s a bit outside the scope of the </a:t>
+            </a:r>
+            <a:r>
+              <a:rPr lang="en-US" baseline="0" dirty="0" err="1"/>
+              <a:t>bootcamp</a:t>
+            </a:r>
+            <a:r>
+              <a:rPr lang="en-US" baseline="0" dirty="0"/>
+              <a:t>. </a:t>
+            </a:r>
+            <a:endParaRPr lang="en-US" dirty="0"/>
           </a:p>
         </p:txBody>
       </p:sp>
@@ -1144,7 +1254,7 @@
             <a:spLocks noGrp="1"/>
           </p:cNvSpPr>
           <p:nvPr>
-            <p:ph type="sldNum" sz="quarter" idx="5"/>
+            <p:ph type="sldNum" sz="quarter" idx="10"/>
           </p:nvPr>
         </p:nvSpPr>
         <p:spPr/>
@@ -1154,7 +1264,7 @@
           <a:p>
             <a:fld id="{FB38BE01-6562-DE45-9404-D6DD8A86E18A}" type="slidenum">
               <a:rPr lang="en-US" smtClean="0"/>
-              <a:t>11</a:t>
+              <a:t>9</a:t>
             </a:fld>
             <a:endParaRPr lang="en-US"/>
           </a:p>
@@ -1163,7 +1273,7 @@
     </p:spTree>
     <p:extLst>
       <p:ext uri="{BB962C8B-B14F-4D97-AF65-F5344CB8AC3E}">
-        <p14:creationId xmlns:p14="http://schemas.microsoft.com/office/powerpoint/2010/main" val="1538892501"/>
+        <p14:creationId xmlns:p14="http://schemas.microsoft.com/office/powerpoint/2010/main" val="192457221"/>
       </p:ext>
     </p:extLst>
   </p:cSld>
@@ -1219,74 +1329,16 @@
           <a:p>
             <a:r>
               <a:rPr lang="en-US" dirty="0"/>
-              <a:t>Note: </a:t>
-            </a:r>
-            <a:r>
-              <a:rPr lang="en-US" i="1" dirty="0"/>
-              <a:t>self </a:t>
-            </a:r>
-            <a:r>
-              <a:rPr lang="en-US" dirty="0"/>
-              <a:t>is not a python keyword. It is standard convention to use </a:t>
-            </a:r>
-            <a:r>
-              <a:rPr lang="en-US" i="1" dirty="0"/>
-              <a:t>self </a:t>
-            </a:r>
-            <a:r>
-              <a:rPr lang="en-US" i="0" dirty="0"/>
-              <a:t>to refer to the instance of the class (i.e. the object), but it </a:t>
-            </a:r>
-            <a:r>
-              <a:rPr lang="en-US" i="1" dirty="0"/>
-              <a:t>must</a:t>
-            </a:r>
-            <a:r>
-              <a:rPr lang="en-US" i="0" dirty="0"/>
-              <a:t> be the first argument.</a:t>
-            </a:r>
-          </a:p>
-          <a:p>
-            <a:endParaRPr lang="en-US" i="0" dirty="0"/>
-          </a:p>
-          <a:p>
-            <a:r>
-              <a:rPr lang="en-US" i="0" dirty="0"/>
-              <a:t>The nomenclature here is enlightening – the keyword </a:t>
-            </a:r>
-            <a:r>
-              <a:rPr lang="en-US" i="1" dirty="0"/>
-              <a:t>class</a:t>
-            </a:r>
-            <a:r>
-              <a:rPr lang="en-US" i="0" dirty="0"/>
-              <a:t> is used because a class implements a “class of objects.” </a:t>
-            </a:r>
-            <a:r>
-              <a:rPr lang="en-US" i="1" dirty="0"/>
-              <a:t>class dog</a:t>
-            </a:r>
-            <a:r>
-              <a:rPr lang="en-US" i="0" dirty="0"/>
-              <a:t> doesn’t represent a single dog, but dogs in the abstract sense, and </a:t>
-            </a:r>
-            <a:r>
-              <a:rPr lang="en-US" i="1" dirty="0"/>
-              <a:t>snoopy</a:t>
-            </a:r>
-            <a:r>
-              <a:rPr lang="en-US" i="0" dirty="0"/>
-              <a:t> is an instance of </a:t>
-            </a:r>
-            <a:r>
-              <a:rPr lang="en-US" i="1" dirty="0"/>
-              <a:t>dog</a:t>
-            </a:r>
-            <a:r>
-              <a:rPr lang="en-US" i="0" dirty="0"/>
-              <a:t> because he is only one dog.</a:t>
-            </a:r>
-            <a:endParaRPr lang="en-US" dirty="0"/>
+              <a:t>We’ll get back to </a:t>
+            </a:r>
+            <a:r>
+              <a:rPr lang="en-US" dirty="0" err="1"/>
+              <a:t>doggos</a:t>
+            </a:r>
+            <a:r>
+              <a:rPr lang="en-US" dirty="0"/>
+              <a:t> in just a second.</a:t>
+            </a:r>
           </a:p>
         </p:txBody>
       </p:sp>
@@ -1307,7 +1359,7 @@
           <a:p>
             <a:fld id="{FB38BE01-6562-DE45-9404-D6DD8A86E18A}" type="slidenum">
               <a:rPr lang="en-US" smtClean="0"/>
-              <a:t>12</a:t>
+              <a:t>11</a:t>
             </a:fld>
             <a:endParaRPr lang="en-US"/>
           </a:p>
@@ -1316,7 +1368,7 @@
     </p:spTree>
     <p:extLst>
       <p:ext uri="{BB962C8B-B14F-4D97-AF65-F5344CB8AC3E}">
-        <p14:creationId xmlns:p14="http://schemas.microsoft.com/office/powerpoint/2010/main" val="1642333116"/>
+        <p14:creationId xmlns:p14="http://schemas.microsoft.com/office/powerpoint/2010/main" val="1538892501"/>
       </p:ext>
     </p:extLst>
   </p:cSld>
@@ -1372,19 +1424,72 @@
           <a:p>
             <a:r>
               <a:rPr lang="en-US" dirty="0"/>
-              <a:t>The key difference between</a:t>
-            </a:r>
-            <a:r>
-              <a:rPr lang="en-US" baseline="0" dirty="0"/>
-              <a:t> static methods and class methods is that static methods don’t interact with a single instance (i.e. they don’t take </a:t>
-            </a:r>
-            <a:r>
-              <a:rPr lang="en-US" i="1" baseline="0" dirty="0"/>
-              <a:t>self</a:t>
-            </a:r>
-            <a:r>
-              <a:rPr lang="en-US" i="0" baseline="0" dirty="0"/>
-              <a:t> as an argument).</a:t>
+              <a:t>Note: </a:t>
+            </a:r>
+            <a:r>
+              <a:rPr lang="en-US" i="1" dirty="0"/>
+              <a:t>self </a:t>
+            </a:r>
+            <a:r>
+              <a:rPr lang="en-US" dirty="0"/>
+              <a:t>is not a python keyword. It is standard convention to use </a:t>
+            </a:r>
+            <a:r>
+              <a:rPr lang="en-US" i="1" dirty="0"/>
+              <a:t>self </a:t>
+            </a:r>
+            <a:r>
+              <a:rPr lang="en-US" i="0" dirty="0"/>
+              <a:t>to refer to the instance of the class (i.e. the object), but it </a:t>
+            </a:r>
+            <a:r>
+              <a:rPr lang="en-US" i="1" dirty="0"/>
+              <a:t>must</a:t>
+            </a:r>
+            <a:r>
+              <a:rPr lang="en-US" i="0" dirty="0"/>
+              <a:t> be the first argument.</a:t>
+            </a:r>
+          </a:p>
+          <a:p>
+            <a:endParaRPr lang="en-US" i="0" dirty="0"/>
+          </a:p>
+          <a:p>
+            <a:r>
+              <a:rPr lang="en-US" i="0" dirty="0"/>
+              <a:t>The nomenclature here is enlightening – the keyword </a:t>
+            </a:r>
+            <a:r>
+              <a:rPr lang="en-US" i="1" dirty="0"/>
+              <a:t>class</a:t>
+            </a:r>
+            <a:r>
+              <a:rPr lang="en-US" i="0" dirty="0"/>
+              <a:t> is used because a class implements a “class of objects.” </a:t>
+            </a:r>
+            <a:r>
+              <a:rPr lang="en-US" i="1" dirty="0"/>
+              <a:t>class dog</a:t>
+            </a:r>
+            <a:r>
+              <a:rPr lang="en-US" i="0" dirty="0"/>
+              <a:t> doesn’t represent a single dog, but dogs in the abstract sense, and </a:t>
+            </a:r>
+            <a:r>
+              <a:rPr lang="en-US" i="1" dirty="0"/>
+              <a:t>snoopy</a:t>
+            </a:r>
+            <a:r>
+              <a:rPr lang="en-US" i="0" dirty="0"/>
+              <a:t> is an instance of </a:t>
+            </a:r>
+            <a:r>
+              <a:rPr lang="en-US" i="1" dirty="0"/>
+              <a:t>dog</a:t>
+            </a:r>
+            <a:r>
+              <a:rPr lang="en-US" i="0" dirty="0"/>
+              <a:t> because he is only one dog.</a:t>
             </a:r>
             <a:endParaRPr lang="en-US" dirty="0"/>
           </a:p>
@@ -1397,7 +1502,7 @@
             <a:spLocks noGrp="1"/>
           </p:cNvSpPr>
           <p:nvPr>
-            <p:ph type="sldNum" sz="quarter" idx="10"/>
+            <p:ph type="sldNum" sz="quarter" idx="5"/>
           </p:nvPr>
         </p:nvSpPr>
         <p:spPr/>
@@ -1407,7 +1512,7 @@
           <a:p>
             <a:fld id="{FB38BE01-6562-DE45-9404-D6DD8A86E18A}" type="slidenum">
               <a:rPr lang="en-US" smtClean="0"/>
-              <a:t>14</a:t>
+              <a:t>12</a:t>
             </a:fld>
             <a:endParaRPr lang="en-US"/>
           </a:p>
@@ -1416,7 +1521,7 @@
     </p:spTree>
     <p:extLst>
       <p:ext uri="{BB962C8B-B14F-4D97-AF65-F5344CB8AC3E}">
-        <p14:creationId xmlns:p14="http://schemas.microsoft.com/office/powerpoint/2010/main" val="1711151255"/>
+        <p14:creationId xmlns:p14="http://schemas.microsoft.com/office/powerpoint/2010/main" val="1642333116"/>
       </p:ext>
     </p:extLst>
   </p:cSld>
@@ -1470,30 +1575,21 @@
           <a:bodyPr/>
           <a:lstStyle/>
           <a:p>
-            <a:pPr marL="0" marR="0" indent="0" algn="l" defTabSz="914400" rtl="0" eaLnBrk="1" fontAlgn="auto" latinLnBrk="0" hangingPunct="1">
-              <a:lnSpc>
-                <a:spcPct val="100000"/>
-              </a:lnSpc>
-              <a:spcBef>
-                <a:spcPts val="0"/>
-              </a:spcBef>
-              <a:spcAft>
-                <a:spcPts val="0"/>
-              </a:spcAft>
-              <a:buClrTx/>
-              <a:buSzTx/>
-              <a:buFontTx/>
-              <a:buNone/>
-              <a:tabLst/>
-              <a:defRPr/>
-            </a:pPr>
             <a:r>
               <a:rPr lang="en-US" dirty="0"/>
               <a:t>The key difference between</a:t>
             </a:r>
             <a:r>
               <a:rPr lang="en-US" baseline="0" dirty="0"/>
-              <a:t> static methods and class methods is that static methods don’t interact with a single instance. </a:t>
+              <a:t> static methods and class methods is that static methods don’t interact with a single instance (i.e. they don’t take </a:t>
+            </a:r>
+            <a:r>
+              <a:rPr lang="en-US" i="1" baseline="0" dirty="0"/>
+              <a:t>self</a:t>
+            </a:r>
+            <a:r>
+              <a:rPr lang="en-US" i="0" baseline="0" dirty="0"/>
+              <a:t> as an argument).</a:t>
             </a:r>
             <a:endParaRPr lang="en-US" dirty="0"/>
           </a:p>
@@ -1516,7 +1612,7 @@
           <a:p>
             <a:fld id="{FB38BE01-6562-DE45-9404-D6DD8A86E18A}" type="slidenum">
               <a:rPr lang="en-US" smtClean="0"/>
-              <a:t>16</a:t>
+              <a:t>14</a:t>
             </a:fld>
             <a:endParaRPr lang="en-US"/>
           </a:p>
@@ -1525,7 +1621,7 @@
     </p:spTree>
     <p:extLst>
       <p:ext uri="{BB962C8B-B14F-4D97-AF65-F5344CB8AC3E}">
-        <p14:creationId xmlns:p14="http://schemas.microsoft.com/office/powerpoint/2010/main" val="680890540"/>
+        <p14:creationId xmlns:p14="http://schemas.microsoft.com/office/powerpoint/2010/main" val="1711151255"/>
       </p:ext>
     </p:extLst>
   </p:cSld>
@@ -1579,13 +1675,30 @@
           <a:bodyPr/>
           <a:lstStyle/>
           <a:p>
-            <a:r>
-              <a:rPr lang="en-US" dirty="0"/>
-              <a:t>Note</a:t>
+            <a:pPr marL="0" marR="0" indent="0" algn="l" defTabSz="914400" rtl="0" eaLnBrk="1" fontAlgn="auto" latinLnBrk="0" hangingPunct="1">
+              <a:lnSpc>
+                <a:spcPct val="100000"/>
+              </a:lnSpc>
+              <a:spcBef>
+                <a:spcPts val="0"/>
+              </a:spcBef>
+              <a:spcAft>
+                <a:spcPts val="0"/>
+              </a:spcAft>
+              <a:buClrTx/>
+              <a:buSzTx/>
+              <a:buFontTx/>
+              <a:buNone/>
+              <a:tabLst/>
+              <a:defRPr/>
+            </a:pPr>
+            <a:r>
+              <a:rPr lang="en-US" dirty="0"/>
+              <a:t>The key difference between</a:t>
             </a:r>
             <a:r>
               <a:rPr lang="en-US" baseline="0" dirty="0"/>
-              <a:t> verbally that there are TWO trailing and leading underscores, four in total </a:t>
+              <a:t> static methods and class methods is that static methods don’t interact with a single instance. </a:t>
             </a:r>
             <a:endParaRPr lang="en-US" dirty="0"/>
           </a:p>
@@ -1608,7 +1721,7 @@
           <a:p>
             <a:fld id="{FB38BE01-6562-DE45-9404-D6DD8A86E18A}" type="slidenum">
               <a:rPr lang="en-US" smtClean="0"/>
-              <a:t>18</a:t>
+              <a:t>16</a:t>
             </a:fld>
             <a:endParaRPr lang="en-US"/>
           </a:p>
@@ -1617,7 +1730,7 @@
     </p:spTree>
     <p:extLst>
       <p:ext uri="{BB962C8B-B14F-4D97-AF65-F5344CB8AC3E}">
-        <p14:creationId xmlns:p14="http://schemas.microsoft.com/office/powerpoint/2010/main" val="1965693612"/>
+        <p14:creationId xmlns:p14="http://schemas.microsoft.com/office/powerpoint/2010/main" val="680890540"/>
       </p:ext>
     </p:extLst>
   </p:cSld>
@@ -1677,15 +1790,7 @@
             </a:r>
             <a:r>
               <a:rPr lang="en-US" baseline="0" dirty="0"/>
-              <a:t> verbally that the </a:t>
-            </a:r>
-            <a:r>
-              <a:rPr lang="en-US" baseline="0" dirty="0" err="1"/>
-              <a:t>coeffs.setter</a:t>
-            </a:r>
-            <a:r>
-              <a:rPr lang="en-US" baseline="0" dirty="0"/>
-              <a:t> function is a good example of production-level code </a:t>
+              <a:t> verbally that there are TWO trailing and leading underscores, four in total </a:t>
             </a:r>
             <a:endParaRPr lang="en-US" dirty="0"/>
           </a:p>
@@ -1708,7 +1813,7 @@
           <a:p>
             <a:fld id="{FB38BE01-6562-DE45-9404-D6DD8A86E18A}" type="slidenum">
               <a:rPr lang="en-US" smtClean="0"/>
-              <a:t>20</a:t>
+              <a:t>18</a:t>
             </a:fld>
             <a:endParaRPr lang="en-US"/>
           </a:p>
@@ -1717,7 +1822,7 @@
     </p:spTree>
     <p:extLst>
       <p:ext uri="{BB962C8B-B14F-4D97-AF65-F5344CB8AC3E}">
-        <p14:creationId xmlns:p14="http://schemas.microsoft.com/office/powerpoint/2010/main" val="505673754"/>
+        <p14:creationId xmlns:p14="http://schemas.microsoft.com/office/powerpoint/2010/main" val="1965693612"/>
       </p:ext>
     </p:extLst>
   </p:cSld>
@@ -2003,7 +2108,7 @@
           <a:p>
             <a:fld id="{51673806-0BCD-1F42-BAA8-2011034B3C6A}" type="datetimeFigureOut">
               <a:rPr lang="en-US" smtClean="0"/>
-              <a:t>5/15/22</a:t>
+              <a:t>5/16/22</a:t>
             </a:fld>
             <a:endParaRPr lang="en-US"/>
           </a:p>
@@ -2417,7 +2522,7 @@
           <a:p>
             <a:fld id="{51673806-0BCD-1F42-BAA8-2011034B3C6A}" type="datetimeFigureOut">
               <a:rPr lang="en-US" smtClean="0"/>
-              <a:t>5/15/22</a:t>
+              <a:t>5/16/22</a:t>
             </a:fld>
             <a:endParaRPr lang="en-US"/>
           </a:p>
@@ -2748,7 +2853,7 @@
           <a:p>
             <a:fld id="{51673806-0BCD-1F42-BAA8-2011034B3C6A}" type="datetimeFigureOut">
               <a:rPr lang="en-US" smtClean="0"/>
-              <a:t>5/15/22</a:t>
+              <a:t>5/16/22</a:t>
             </a:fld>
             <a:endParaRPr lang="en-US"/>
           </a:p>
@@ -3148,7 +3253,7 @@
           <a:p>
             <a:fld id="{51673806-0BCD-1F42-BAA8-2011034B3C6A}" type="datetimeFigureOut">
               <a:rPr lang="en-US" smtClean="0"/>
-              <a:t>5/15/22</a:t>
+              <a:t>5/16/22</a:t>
             </a:fld>
             <a:endParaRPr lang="en-US"/>
           </a:p>
@@ -3711,7 +3816,7 @@
           <a:p>
             <a:fld id="{51673806-0BCD-1F42-BAA8-2011034B3C6A}" type="datetimeFigureOut">
               <a:rPr lang="en-US" smtClean="0"/>
-              <a:t>5/15/22</a:t>
+              <a:t>5/16/22</a:t>
             </a:fld>
             <a:endParaRPr lang="en-US"/>
           </a:p>
@@ -4387,7 +4492,7 @@
           <a:p>
             <a:fld id="{51673806-0BCD-1F42-BAA8-2011034B3C6A}" type="datetimeFigureOut">
               <a:rPr lang="en-US" smtClean="0"/>
-              <a:t>5/15/22</a:t>
+              <a:t>5/16/22</a:t>
             </a:fld>
             <a:endParaRPr lang="en-US"/>
           </a:p>
@@ -5295,7 +5400,7 @@
           <a:p>
             <a:fld id="{51673806-0BCD-1F42-BAA8-2011034B3C6A}" type="datetimeFigureOut">
               <a:rPr lang="en-US" smtClean="0"/>
-              <a:t>5/15/22</a:t>
+              <a:t>5/16/22</a:t>
             </a:fld>
             <a:endParaRPr lang="en-US"/>
           </a:p>
@@ -5603,7 +5708,7 @@
           <a:p>
             <a:fld id="{51673806-0BCD-1F42-BAA8-2011034B3C6A}" type="datetimeFigureOut">
               <a:rPr lang="en-US" smtClean="0"/>
-              <a:t>5/15/22</a:t>
+              <a:t>5/16/22</a:t>
             </a:fld>
             <a:endParaRPr lang="en-US"/>
           </a:p>
@@ -5862,7 +5967,7 @@
           <a:p>
             <a:fld id="{51673806-0BCD-1F42-BAA8-2011034B3C6A}" type="datetimeFigureOut">
               <a:rPr lang="en-US" smtClean="0"/>
-              <a:t>5/15/22</a:t>
+              <a:t>5/16/22</a:t>
             </a:fld>
             <a:endParaRPr lang="en-US"/>
           </a:p>
@@ -6185,7 +6290,7 @@
           <a:p>
             <a:fld id="{51673806-0BCD-1F42-BAA8-2011034B3C6A}" type="datetimeFigureOut">
               <a:rPr lang="en-US" smtClean="0"/>
-              <a:t>5/15/22</a:t>
+              <a:t>5/16/22</a:t>
             </a:fld>
             <a:endParaRPr lang="en-US"/>
           </a:p>
@@ -6569,7 +6674,7 @@
           <a:p>
             <a:fld id="{51673806-0BCD-1F42-BAA8-2011034B3C6A}" type="datetimeFigureOut">
               <a:rPr lang="en-US" smtClean="0"/>
-              <a:t>5/15/22</a:t>
+              <a:t>5/16/22</a:t>
             </a:fld>
             <a:endParaRPr lang="en-US"/>
           </a:p>
@@ -6945,7 +7050,7 @@
           <a:p>
             <a:fld id="{51673806-0BCD-1F42-BAA8-2011034B3C6A}" type="datetimeFigureOut">
               <a:rPr lang="en-US" smtClean="0"/>
-              <a:t>5/15/22</a:t>
+              <a:t>5/16/22</a:t>
             </a:fld>
             <a:endParaRPr lang="en-US"/>
           </a:p>
@@ -7451,7 +7556,7 @@
           <a:p>
             <a:fld id="{51673806-0BCD-1F42-BAA8-2011034B3C6A}" type="datetimeFigureOut">
               <a:rPr lang="en-US" smtClean="0"/>
-              <a:t>5/15/22</a:t>
+              <a:t>5/16/22</a:t>
             </a:fld>
             <a:endParaRPr lang="en-US"/>
           </a:p>
@@ -7708,7 +7813,7 @@
           <a:p>
             <a:fld id="{51673806-0BCD-1F42-BAA8-2011034B3C6A}" type="datetimeFigureOut">
               <a:rPr lang="en-US" smtClean="0"/>
-              <a:t>5/15/22</a:t>
+              <a:t>5/16/22</a:t>
             </a:fld>
             <a:endParaRPr lang="en-US"/>
           </a:p>
@@ -7866,7 +7971,7 @@
           <a:p>
             <a:fld id="{51673806-0BCD-1F42-BAA8-2011034B3C6A}" type="datetimeFigureOut">
               <a:rPr lang="en-US" smtClean="0"/>
-              <a:t>5/15/22</a:t>
+              <a:t>5/16/22</a:t>
             </a:fld>
             <a:endParaRPr lang="en-US"/>
           </a:p>
@@ -8256,7 +8361,7 @@
           <a:p>
             <a:fld id="{51673806-0BCD-1F42-BAA8-2011034B3C6A}" type="datetimeFigureOut">
               <a:rPr lang="en-US" smtClean="0"/>
-              <a:t>5/15/22</a:t>
+              <a:t>5/16/22</a:t>
             </a:fld>
             <a:endParaRPr lang="en-US"/>
           </a:p>
@@ -8665,7 +8770,7 @@
           <a:p>
             <a:fld id="{51673806-0BCD-1F42-BAA8-2011034B3C6A}" type="datetimeFigureOut">
               <a:rPr lang="en-US" smtClean="0"/>
-              <a:t>5/15/22</a:t>
+              <a:t>5/16/22</a:t>
             </a:fld>
             <a:endParaRPr lang="en-US"/>
           </a:p>
@@ -8911,7 +9016,7 @@
             <a:fld id="{51673806-0BCD-1F42-BAA8-2011034B3C6A}" type="datetimeFigureOut">
               <a:rPr lang="en-US" smtClean="0"/>
               <a:pPr/>
-              <a:t>5/15/22</a:t>
+              <a:t>5/16/22</a:t>
             </a:fld>
             <a:endParaRPr lang="en-US" dirty="0"/>
           </a:p>
@@ -13551,15 +13656,7 @@
             </a:pPr>
             <a:r>
               <a:rPr lang="en-US" dirty="0"/>
-              <a:t>This is a essentially a reimplementation of </a:t>
-            </a:r>
-            <a:r>
-              <a:rPr lang="en-US" dirty="0" err="1"/>
-              <a:t>NumPy’s</a:t>
-            </a:r>
-            <a:r>
-              <a:rPr lang="en-US" dirty="0"/>
-              <a:t> </a:t>
+              <a:t>This is essentially a reimplementation of NumPy’s </a:t>
             </a:r>
             <a:r>
               <a:rPr lang="en-US" i="1" dirty="0"/>
@@ -14840,7 +14937,7 @@
             </a:pPr>
             <a:r>
               <a:rPr lang="en-US" dirty="0"/>
-              <a:t>Unary -: Each coefficient is the negative of the origin </a:t>
+              <a:t>Unary -: Each coefficient is the negative of the original</a:t>
             </a:r>
           </a:p>
           <a:p>
@@ -14927,7 +15024,7 @@
             </a:pPr>
             <a:r>
               <a:rPr lang="en-US" dirty="0"/>
-              <a:t>Magic methods can return anything, hence need to specifically create a polynomial object. They don’t call </a:t>
+              <a:t>Magic methods can return anything, hence the need to specifically create a polynomial object. They don’t call </a:t>
             </a:r>
             <a:r>
               <a:rPr lang="en-US" i="1" dirty="0"/>
@@ -16865,7 +16962,7 @@
             </a:pPr>
             <a:r>
               <a:rPr lang="en-US" dirty="0"/>
-              <a:t>Functions: bark, roll over, shake, eat, drink, chase tail </a:t>
+              <a:t>Functions: bark, roll over, shake, eat, drink, chase their tail </a:t>
             </a:r>
           </a:p>
           <a:p>
@@ -16951,13 +17048,8 @@
             </a:pPr>
             <a:r>
               <a:rPr lang="en-US" dirty="0"/>
-              <a:t>Interactions with other objects: play with </a:t>
-            </a:r>
-            <a:r>
-              <a:rPr lang="en-US"/>
-              <a:t>other dogs/owner, chase cats </a:t>
-            </a:r>
-            <a:endParaRPr lang="en-US" dirty="0"/>
+              <a:t>Interactions with other objects: play with other dogs/owner, chase cats </a:t>
+            </a:r>
           </a:p>
         </p:txBody>
       </p:sp>
@@ -17129,7 +17221,7 @@
           <p:nvPr/>
         </p:nvPicPr>
         <p:blipFill>
-          <a:blip r:embed="rId2">
+          <a:blip r:embed="rId3">
             <a:extLst>
               <a:ext uri="{28A0092B-C50C-407E-A947-70E740481C1C}">
                 <a14:useLocalDpi xmlns:a14="http://schemas.microsoft.com/office/drawing/2010/main" val="0"/>
@@ -17159,7 +17251,7 @@
           <p:nvPr/>
         </p:nvPicPr>
         <p:blipFill>
-          <a:blip r:embed="rId3">
+          <a:blip r:embed="rId4">
             <a:extLst>
               <a:ext uri="{28A0092B-C50C-407E-A947-70E740481C1C}">
                 <a14:useLocalDpi xmlns:a14="http://schemas.microsoft.com/office/drawing/2010/main" val="0"/>

</xml_diff>